<commit_message>
updated plots, repo has journal submission packet
</commit_message>
<xml_diff>
--- a/admin/plot-editing.pptx
+++ b/admin/plot-editing.pptx
@@ -5,17 +5,18 @@
     <p:sldMasterId id="2147483660" r:id="rId1"/>
   </p:sldMasterIdLst>
   <p:notesMasterIdLst>
-    <p:notesMasterId r:id="rId10"/>
+    <p:notesMasterId r:id="rId11"/>
   </p:notesMasterIdLst>
   <p:sldIdLst>
     <p:sldId id="316" r:id="rId2"/>
     <p:sldId id="260" r:id="rId3"/>
-    <p:sldId id="261" r:id="rId4"/>
-    <p:sldId id="262" r:id="rId5"/>
-    <p:sldId id="264" r:id="rId6"/>
-    <p:sldId id="263" r:id="rId7"/>
-    <p:sldId id="265" r:id="rId8"/>
+    <p:sldId id="318" r:id="rId4"/>
+    <p:sldId id="261" r:id="rId5"/>
+    <p:sldId id="262" r:id="rId6"/>
+    <p:sldId id="264" r:id="rId7"/>
+    <p:sldId id="263" r:id="rId8"/>
     <p:sldId id="317" r:id="rId9"/>
+    <p:sldId id="319" r:id="rId10"/>
   </p:sldIdLst>
   <p:sldSz cx="9144000" cy="6858000" type="screen4x3"/>
   <p:notesSz cx="6858000" cy="9144000"/>
@@ -204,7 +205,7 @@
           <a:p>
             <a:fld id="{28BB845A-8D3D-7546-82B5-222C64D3BA4D}" type="datetimeFigureOut">
               <a:rPr lang="en-US" smtClean="0"/>
-              <a:t>4/20/20</a:t>
+              <a:t>6/30/20</a:t>
             </a:fld>
             <a:endParaRPr lang="en-US"/>
           </a:p>
@@ -686,7 +687,7 @@
           <a:p>
             <a:fld id="{9347E118-E456-1F40-BBD6-4856F8C7E635}" type="datetimeFigureOut">
               <a:rPr lang="en-US" smtClean="0"/>
-              <a:t>4/20/20</a:t>
+              <a:t>6/30/20</a:t>
             </a:fld>
             <a:endParaRPr lang="en-US"/>
           </a:p>
@@ -856,7 +857,7 @@
           <a:p>
             <a:fld id="{9347E118-E456-1F40-BBD6-4856F8C7E635}" type="datetimeFigureOut">
               <a:rPr lang="en-US" smtClean="0"/>
-              <a:t>4/20/20</a:t>
+              <a:t>6/30/20</a:t>
             </a:fld>
             <a:endParaRPr lang="en-US"/>
           </a:p>
@@ -1036,7 +1037,7 @@
           <a:p>
             <a:fld id="{9347E118-E456-1F40-BBD6-4856F8C7E635}" type="datetimeFigureOut">
               <a:rPr lang="en-US" smtClean="0"/>
-              <a:t>4/20/20</a:t>
+              <a:t>6/30/20</a:t>
             </a:fld>
             <a:endParaRPr lang="en-US"/>
           </a:p>
@@ -1206,7 +1207,7 @@
           <a:p>
             <a:fld id="{9347E118-E456-1F40-BBD6-4856F8C7E635}" type="datetimeFigureOut">
               <a:rPr lang="en-US" smtClean="0"/>
-              <a:t>4/20/20</a:t>
+              <a:t>6/30/20</a:t>
             </a:fld>
             <a:endParaRPr lang="en-US"/>
           </a:p>
@@ -1450,7 +1451,7 @@
           <a:p>
             <a:fld id="{9347E118-E456-1F40-BBD6-4856F8C7E635}" type="datetimeFigureOut">
               <a:rPr lang="en-US" smtClean="0"/>
-              <a:t>4/20/20</a:t>
+              <a:t>6/30/20</a:t>
             </a:fld>
             <a:endParaRPr lang="en-US"/>
           </a:p>
@@ -1682,7 +1683,7 @@
           <a:p>
             <a:fld id="{9347E118-E456-1F40-BBD6-4856F8C7E635}" type="datetimeFigureOut">
               <a:rPr lang="en-US" smtClean="0"/>
-              <a:t>4/20/20</a:t>
+              <a:t>6/30/20</a:t>
             </a:fld>
             <a:endParaRPr lang="en-US"/>
           </a:p>
@@ -2049,7 +2050,7 @@
           <a:p>
             <a:fld id="{9347E118-E456-1F40-BBD6-4856F8C7E635}" type="datetimeFigureOut">
               <a:rPr lang="en-US" smtClean="0"/>
-              <a:t>4/20/20</a:t>
+              <a:t>6/30/20</a:t>
             </a:fld>
             <a:endParaRPr lang="en-US"/>
           </a:p>
@@ -2167,7 +2168,7 @@
           <a:p>
             <a:fld id="{9347E118-E456-1F40-BBD6-4856F8C7E635}" type="datetimeFigureOut">
               <a:rPr lang="en-US" smtClean="0"/>
-              <a:t>4/20/20</a:t>
+              <a:t>6/30/20</a:t>
             </a:fld>
             <a:endParaRPr lang="en-US"/>
           </a:p>
@@ -2262,7 +2263,7 @@
           <a:p>
             <a:fld id="{9347E118-E456-1F40-BBD6-4856F8C7E635}" type="datetimeFigureOut">
               <a:rPr lang="en-US" smtClean="0"/>
-              <a:t>4/20/20</a:t>
+              <a:t>6/30/20</a:t>
             </a:fld>
             <a:endParaRPr lang="en-US"/>
           </a:p>
@@ -2539,7 +2540,7 @@
           <a:p>
             <a:fld id="{9347E118-E456-1F40-BBD6-4856F8C7E635}" type="datetimeFigureOut">
               <a:rPr lang="en-US" smtClean="0"/>
-              <a:t>4/20/20</a:t>
+              <a:t>6/30/20</a:t>
             </a:fld>
             <a:endParaRPr lang="en-US"/>
           </a:p>
@@ -2796,7 +2797,7 @@
           <a:p>
             <a:fld id="{9347E118-E456-1F40-BBD6-4856F8C7E635}" type="datetimeFigureOut">
               <a:rPr lang="en-US" smtClean="0"/>
-              <a:t>4/20/20</a:t>
+              <a:t>6/30/20</a:t>
             </a:fld>
             <a:endParaRPr lang="en-US"/>
           </a:p>
@@ -3009,7 +3010,7 @@
           <a:p>
             <a:fld id="{9347E118-E456-1F40-BBD6-4856F8C7E635}" type="datetimeFigureOut">
               <a:rPr lang="en-US" smtClean="0"/>
-              <a:t>4/20/20</a:t>
+              <a:t>6/30/20</a:t>
             </a:fld>
             <a:endParaRPr lang="en-US"/>
           </a:p>
@@ -6467,7 +6468,7 @@
           <p:spPr>
             <a:xfrm>
               <a:off x="5760710" y="896865"/>
-              <a:ext cx="2523858" cy="4213745"/>
+              <a:ext cx="2523857" cy="4213745"/>
             </a:xfrm>
             <a:prstGeom prst="rect">
               <a:avLst/>
@@ -6497,7 +6498,7 @@
           <p:spPr>
             <a:xfrm>
               <a:off x="3352863" y="898052"/>
-              <a:ext cx="2373347" cy="4219283"/>
+              <a:ext cx="2373346" cy="4219283"/>
             </a:xfrm>
             <a:prstGeom prst="rect">
               <a:avLst/>
@@ -6527,7 +6528,7 @@
           <p:spPr>
             <a:xfrm>
               <a:off x="949617" y="896866"/>
-              <a:ext cx="2376157" cy="4224279"/>
+              <a:ext cx="2376156" cy="4224279"/>
             </a:xfrm>
             <a:prstGeom prst="rect">
               <a:avLst/>
@@ -7203,6 +7204,851 @@
 </file>
 
 <file path=ppt/slides/slide3.xml><?xml version="1.0" encoding="utf-8"?>
+<p:sld xmlns:a="http://schemas.openxmlformats.org/drawingml/2006/main" xmlns:r="http://schemas.openxmlformats.org/officeDocument/2006/relationships" xmlns:p="http://schemas.openxmlformats.org/presentationml/2006/main">
+  <p:cSld>
+    <p:spTree>
+      <p:nvGrpSpPr>
+        <p:cNvPr id="1" name=""/>
+        <p:cNvGrpSpPr/>
+        <p:nvPr/>
+      </p:nvGrpSpPr>
+      <p:grpSpPr>
+        <a:xfrm>
+          <a:off x="0" y="0"/>
+          <a:ext cx="0" cy="0"/>
+          <a:chOff x="0" y="0"/>
+          <a:chExt cx="0" cy="0"/>
+        </a:xfrm>
+      </p:grpSpPr>
+      <p:grpSp>
+        <p:nvGrpSpPr>
+          <p:cNvPr id="16" name="Group 15">
+            <a:extLst>
+              <a:ext uri="{FF2B5EF4-FFF2-40B4-BE49-F238E27FC236}">
+                <a16:creationId xmlns:a16="http://schemas.microsoft.com/office/drawing/2014/main" id="{C58E4512-DDCB-7046-8815-764C01D4D53F}"/>
+              </a:ext>
+            </a:extLst>
+          </p:cNvPr>
+          <p:cNvGrpSpPr/>
+          <p:nvPr/>
+        </p:nvGrpSpPr>
+        <p:grpSpPr>
+          <a:xfrm>
+            <a:off x="129551" y="635557"/>
+            <a:ext cx="8425618" cy="4899883"/>
+            <a:chOff x="129551" y="635557"/>
+            <a:chExt cx="8425618" cy="4899883"/>
+          </a:xfrm>
+        </p:grpSpPr>
+        <p:grpSp>
+          <p:nvGrpSpPr>
+            <p:cNvPr id="20" name="Group 19">
+              <a:extLst>
+                <a:ext uri="{FF2B5EF4-FFF2-40B4-BE49-F238E27FC236}">
+                  <a16:creationId xmlns:a16="http://schemas.microsoft.com/office/drawing/2014/main" id="{BF62BA24-0033-CC48-8690-EEBBD18DAAF4}"/>
+                </a:ext>
+              </a:extLst>
+            </p:cNvPr>
+            <p:cNvGrpSpPr/>
+            <p:nvPr/>
+          </p:nvGrpSpPr>
+          <p:grpSpPr>
+            <a:xfrm>
+              <a:off x="129551" y="635557"/>
+              <a:ext cx="8425618" cy="4615038"/>
+              <a:chOff x="129551" y="635557"/>
+              <a:chExt cx="8425618" cy="4615038"/>
+            </a:xfrm>
+          </p:grpSpPr>
+          <p:pic>
+            <p:nvPicPr>
+              <p:cNvPr id="19" name="Picture 18">
+                <a:extLst>
+                  <a:ext uri="{FF2B5EF4-FFF2-40B4-BE49-F238E27FC236}">
+                    <a16:creationId xmlns:a16="http://schemas.microsoft.com/office/drawing/2014/main" id="{EE3D3E7C-0F4C-1E4D-B2DD-FE4872BA20E0}"/>
+                  </a:ext>
+                </a:extLst>
+              </p:cNvPr>
+              <p:cNvPicPr>
+                <a:picLocks noChangeAspect="1"/>
+              </p:cNvPicPr>
+              <p:nvPr/>
+            </p:nvPicPr>
+            <p:blipFill>
+              <a:blip r:embed="rId2"/>
+              <a:stretch>
+                <a:fillRect/>
+              </a:stretch>
+            </p:blipFill>
+            <p:spPr>
+              <a:xfrm>
+                <a:off x="5760710" y="896866"/>
+                <a:ext cx="2523857" cy="4213743"/>
+              </a:xfrm>
+              <a:prstGeom prst="rect">
+                <a:avLst/>
+              </a:prstGeom>
+            </p:spPr>
+          </p:pic>
+          <p:pic>
+            <p:nvPicPr>
+              <p:cNvPr id="17" name="Picture 16">
+                <a:extLst>
+                  <a:ext uri="{FF2B5EF4-FFF2-40B4-BE49-F238E27FC236}">
+                    <a16:creationId xmlns:a16="http://schemas.microsoft.com/office/drawing/2014/main" id="{44F70E73-ACCD-A74A-A554-11C62795C50D}"/>
+                  </a:ext>
+                </a:extLst>
+              </p:cNvPr>
+              <p:cNvPicPr>
+                <a:picLocks noChangeAspect="1"/>
+              </p:cNvPicPr>
+              <p:nvPr/>
+            </p:nvPicPr>
+            <p:blipFill>
+              <a:blip r:embed="rId3"/>
+              <a:stretch>
+                <a:fillRect/>
+              </a:stretch>
+            </p:blipFill>
+            <p:spPr>
+              <a:xfrm>
+                <a:off x="3352863" y="898053"/>
+                <a:ext cx="2373346" cy="4219281"/>
+              </a:xfrm>
+              <a:prstGeom prst="rect">
+                <a:avLst/>
+              </a:prstGeom>
+            </p:spPr>
+          </p:pic>
+          <p:pic>
+            <p:nvPicPr>
+              <p:cNvPr id="15" name="Picture 14">
+                <a:extLst>
+                  <a:ext uri="{FF2B5EF4-FFF2-40B4-BE49-F238E27FC236}">
+                    <a16:creationId xmlns:a16="http://schemas.microsoft.com/office/drawing/2014/main" id="{F99B17E9-95EF-624D-906F-DA9FA88C2CD8}"/>
+                  </a:ext>
+                </a:extLst>
+              </p:cNvPr>
+              <p:cNvPicPr>
+                <a:picLocks noChangeAspect="1"/>
+              </p:cNvPicPr>
+              <p:nvPr/>
+            </p:nvPicPr>
+            <p:blipFill>
+              <a:blip r:embed="rId4"/>
+              <a:stretch>
+                <a:fillRect/>
+              </a:stretch>
+            </p:blipFill>
+            <p:spPr>
+              <a:xfrm>
+                <a:off x="949617" y="896867"/>
+                <a:ext cx="2376156" cy="4224277"/>
+              </a:xfrm>
+              <a:prstGeom prst="rect">
+                <a:avLst/>
+              </a:prstGeom>
+            </p:spPr>
+          </p:pic>
+          <p:grpSp>
+            <p:nvGrpSpPr>
+              <p:cNvPr id="11" name="Group 10">
+                <a:extLst>
+                  <a:ext uri="{FF2B5EF4-FFF2-40B4-BE49-F238E27FC236}">
+                    <a16:creationId xmlns:a16="http://schemas.microsoft.com/office/drawing/2014/main" id="{A2044059-DDF2-2346-8666-6B772F47ADC0}"/>
+                  </a:ext>
+                </a:extLst>
+              </p:cNvPr>
+              <p:cNvGrpSpPr/>
+              <p:nvPr/>
+            </p:nvGrpSpPr>
+            <p:grpSpPr>
+              <a:xfrm>
+                <a:off x="845795" y="635557"/>
+                <a:ext cx="7709374" cy="4615038"/>
+                <a:chOff x="502895" y="284485"/>
+                <a:chExt cx="7709374" cy="4615038"/>
+              </a:xfrm>
+            </p:grpSpPr>
+            <p:grpSp>
+              <p:nvGrpSpPr>
+                <p:cNvPr id="91" name="Group 90">
+                  <a:extLst>
+                    <a:ext uri="{FF2B5EF4-FFF2-40B4-BE49-F238E27FC236}">
+                      <a16:creationId xmlns:a16="http://schemas.microsoft.com/office/drawing/2014/main" id="{0AF64FDD-70D0-6C46-9EBB-3D5FC3D00D94}"/>
+                    </a:ext>
+                  </a:extLst>
+                </p:cNvPr>
+                <p:cNvGrpSpPr/>
+                <p:nvPr/>
+              </p:nvGrpSpPr>
+              <p:grpSpPr>
+                <a:xfrm>
+                  <a:off x="965732" y="284485"/>
+                  <a:ext cx="7246537" cy="3392284"/>
+                  <a:chOff x="965732" y="284485"/>
+                  <a:chExt cx="7246537" cy="3392284"/>
+                </a:xfrm>
+              </p:grpSpPr>
+              <p:sp>
+                <p:nvSpPr>
+                  <p:cNvPr id="7" name="TextBox 6">
+                    <a:extLst>
+                      <a:ext uri="{FF2B5EF4-FFF2-40B4-BE49-F238E27FC236}">
+                        <a16:creationId xmlns:a16="http://schemas.microsoft.com/office/drawing/2014/main" id="{DCD07132-0EF3-C045-AD85-4BE035150493}"/>
+                      </a:ext>
+                    </a:extLst>
+                  </p:cNvPr>
+                  <p:cNvSpPr txBox="1"/>
+                  <p:nvPr/>
+                </p:nvSpPr>
+                <p:spPr>
+                  <a:xfrm>
+                    <a:off x="965732" y="307154"/>
+                    <a:ext cx="2111501" cy="261610"/>
+                  </a:xfrm>
+                  <a:prstGeom prst="rect">
+                    <a:avLst/>
+                  </a:prstGeom>
+                  <a:noFill/>
+                </p:spPr>
+                <p:txBody>
+                  <a:bodyPr wrap="square" rtlCol="0">
+                    <a:spAutoFit/>
+                  </a:bodyPr>
+                  <a:lstStyle/>
+                  <a:p>
+                    <a:r>
+                      <a:rPr lang="en-US" sz="1100" dirty="0">
+                        <a:solidFill>
+                          <a:schemeClr val="tx1">
+                            <a:lumMod val="75000"/>
+                            <a:lumOff val="25000"/>
+                          </a:schemeClr>
+                        </a:solidFill>
+                        <a:latin typeface="Arial" panose="020B0604020202020204" pitchFamily="34" charset="0"/>
+                        <a:cs typeface="Arial" panose="020B0604020202020204" pitchFamily="34" charset="0"/>
+                      </a:rPr>
+                      <a:t>Predominant Gonad Sex</a:t>
+                    </a:r>
+                  </a:p>
+                </p:txBody>
+              </p:sp>
+              <p:sp>
+                <p:nvSpPr>
+                  <p:cNvPr id="8" name="TextBox 7">
+                    <a:extLst>
+                      <a:ext uri="{FF2B5EF4-FFF2-40B4-BE49-F238E27FC236}">
+                        <a16:creationId xmlns:a16="http://schemas.microsoft.com/office/drawing/2014/main" id="{9DA0215A-45C1-C74D-BF67-DEB80016112A}"/>
+                      </a:ext>
+                    </a:extLst>
+                  </p:cNvPr>
+                  <p:cNvSpPr txBox="1"/>
+                  <p:nvPr/>
+                </p:nvSpPr>
+                <p:spPr>
+                  <a:xfrm>
+                    <a:off x="3255109" y="285798"/>
+                    <a:ext cx="1625177" cy="261610"/>
+                  </a:xfrm>
+                  <a:prstGeom prst="rect">
+                    <a:avLst/>
+                  </a:prstGeom>
+                  <a:noFill/>
+                </p:spPr>
+                <p:txBody>
+                  <a:bodyPr wrap="square" rtlCol="0">
+                    <a:spAutoFit/>
+                  </a:bodyPr>
+                  <a:lstStyle/>
+                  <a:p>
+                    <a:pPr algn="ctr"/>
+                    <a:r>
+                      <a:rPr lang="en-US" sz="1100" dirty="0">
+                        <a:solidFill>
+                          <a:schemeClr val="tx1">
+                            <a:lumMod val="75000"/>
+                            <a:lumOff val="25000"/>
+                          </a:schemeClr>
+                        </a:solidFill>
+                        <a:latin typeface="Arial" panose="020B0604020202020204" pitchFamily="34" charset="0"/>
+                        <a:cs typeface="Arial" panose="020B0604020202020204" pitchFamily="34" charset="0"/>
+                      </a:rPr>
+                      <a:t>Oocyte stage</a:t>
+                    </a:r>
+                  </a:p>
+                </p:txBody>
+              </p:sp>
+              <p:sp>
+                <p:nvSpPr>
+                  <p:cNvPr id="10" name="TextBox 9">
+                    <a:extLst>
+                      <a:ext uri="{FF2B5EF4-FFF2-40B4-BE49-F238E27FC236}">
+                        <a16:creationId xmlns:a16="http://schemas.microsoft.com/office/drawing/2014/main" id="{8E4D9B60-852D-5240-AB7C-E27CF74004EF}"/>
+                      </a:ext>
+                    </a:extLst>
+                  </p:cNvPr>
+                  <p:cNvSpPr txBox="1"/>
+                  <p:nvPr/>
+                </p:nvSpPr>
+                <p:spPr>
+                  <a:xfrm>
+                    <a:off x="5858659" y="284485"/>
+                    <a:ext cx="1923204" cy="261610"/>
+                  </a:xfrm>
+                  <a:prstGeom prst="rect">
+                    <a:avLst/>
+                  </a:prstGeom>
+                  <a:noFill/>
+                </p:spPr>
+                <p:txBody>
+                  <a:bodyPr wrap="square" rtlCol="0">
+                    <a:spAutoFit/>
+                  </a:bodyPr>
+                  <a:lstStyle/>
+                  <a:p>
+                    <a:r>
+                      <a:rPr lang="en-US" sz="1100" dirty="0">
+                        <a:solidFill>
+                          <a:schemeClr val="tx1">
+                            <a:lumMod val="75000"/>
+                            <a:lumOff val="25000"/>
+                          </a:schemeClr>
+                        </a:solidFill>
+                        <a:latin typeface="Arial" panose="020B0604020202020204" pitchFamily="34" charset="0"/>
+                        <a:cs typeface="Arial" panose="020B0604020202020204" pitchFamily="34" charset="0"/>
+                      </a:rPr>
+                      <a:t>Spermatocyte Stage</a:t>
+                    </a:r>
+                  </a:p>
+                </p:txBody>
+              </p:sp>
+              <p:sp>
+                <p:nvSpPr>
+                  <p:cNvPr id="49" name="TextBox 48">
+                    <a:extLst>
+                      <a:ext uri="{FF2B5EF4-FFF2-40B4-BE49-F238E27FC236}">
+                        <a16:creationId xmlns:a16="http://schemas.microsoft.com/office/drawing/2014/main" id="{C995DEEA-F2B9-9A43-8A23-F6C7C2515277}"/>
+                      </a:ext>
+                    </a:extLst>
+                  </p:cNvPr>
+                  <p:cNvSpPr txBox="1"/>
+                  <p:nvPr/>
+                </p:nvSpPr>
+                <p:spPr>
+                  <a:xfrm rot="5400000">
+                    <a:off x="6764341" y="2228840"/>
+                    <a:ext cx="2618858" cy="276999"/>
+                  </a:xfrm>
+                  <a:prstGeom prst="rect">
+                    <a:avLst/>
+                  </a:prstGeom>
+                  <a:noFill/>
+                </p:spPr>
+                <p:txBody>
+                  <a:bodyPr wrap="square" rtlCol="0">
+                    <a:spAutoFit/>
+                  </a:bodyPr>
+                  <a:lstStyle/>
+                  <a:p>
+                    <a:pPr algn="r"/>
+                    <a:r>
+                      <a:rPr lang="en-US" sz="1200" dirty="0">
+                        <a:solidFill>
+                          <a:schemeClr val="tx1">
+                            <a:lumMod val="75000"/>
+                            <a:lumOff val="25000"/>
+                          </a:schemeClr>
+                        </a:solidFill>
+                        <a:latin typeface="Arial" panose="020B0604020202020204" pitchFamily="34" charset="0"/>
+                        <a:cs typeface="Arial" panose="020B0604020202020204" pitchFamily="34" charset="0"/>
+                      </a:rPr>
+                      <a:t>Percent of oysters sampled</a:t>
+                    </a:r>
+                  </a:p>
+                </p:txBody>
+              </p:sp>
+            </p:grpSp>
+            <p:pic>
+              <p:nvPicPr>
+                <p:cNvPr id="3" name="Picture 2">
+                  <a:extLst>
+                    <a:ext uri="{FF2B5EF4-FFF2-40B4-BE49-F238E27FC236}">
+                      <a16:creationId xmlns:a16="http://schemas.microsoft.com/office/drawing/2014/main" id="{5D59D35F-C058-2F41-A619-03812C72C1F9}"/>
+                    </a:ext>
+                  </a:extLst>
+                </p:cNvPr>
+                <p:cNvPicPr>
+                  <a:picLocks noChangeAspect="1"/>
+                </p:cNvPicPr>
+                <p:nvPr/>
+              </p:nvPicPr>
+              <p:blipFill rotWithShape="1">
+                <a:blip r:embed="rId5"/>
+                <a:srcRect t="57380" b="25879"/>
+                <a:stretch/>
+              </p:blipFill>
+              <p:spPr>
+                <a:xfrm>
+                  <a:off x="3011722" y="4712098"/>
+                  <a:ext cx="2373347" cy="176583"/>
+                </a:xfrm>
+                <a:prstGeom prst="rect">
+                  <a:avLst/>
+                </a:prstGeom>
+              </p:spPr>
+            </p:pic>
+            <p:pic>
+              <p:nvPicPr>
+                <p:cNvPr id="9" name="Picture 8">
+                  <a:extLst>
+                    <a:ext uri="{FF2B5EF4-FFF2-40B4-BE49-F238E27FC236}">
+                      <a16:creationId xmlns:a16="http://schemas.microsoft.com/office/drawing/2014/main" id="{E046EBFC-676B-C347-9B08-E54AD7C8849F}"/>
+                    </a:ext>
+                  </a:extLst>
+                </p:cNvPr>
+                <p:cNvPicPr>
+                  <a:picLocks noChangeAspect="1"/>
+                </p:cNvPicPr>
+                <p:nvPr/>
+              </p:nvPicPr>
+              <p:blipFill rotWithShape="1">
+                <a:blip r:embed="rId6"/>
+                <a:srcRect t="57529" b="25836"/>
+                <a:stretch/>
+              </p:blipFill>
+              <p:spPr>
+                <a:xfrm>
+                  <a:off x="5393498" y="4722940"/>
+                  <a:ext cx="2388365" cy="176583"/>
+                </a:xfrm>
+                <a:prstGeom prst="rect">
+                  <a:avLst/>
+                </a:prstGeom>
+              </p:spPr>
+            </p:pic>
+            <p:pic>
+              <p:nvPicPr>
+                <p:cNvPr id="5" name="Picture 4">
+                  <a:extLst>
+                    <a:ext uri="{FF2B5EF4-FFF2-40B4-BE49-F238E27FC236}">
+                      <a16:creationId xmlns:a16="http://schemas.microsoft.com/office/drawing/2014/main" id="{4FD53668-9271-8841-8EF5-C92E9F552462}"/>
+                    </a:ext>
+                  </a:extLst>
+                </p:cNvPr>
+                <p:cNvPicPr>
+                  <a:picLocks noChangeAspect="1"/>
+                </p:cNvPicPr>
+                <p:nvPr/>
+              </p:nvPicPr>
+              <p:blipFill rotWithShape="1">
+                <a:blip r:embed="rId7"/>
+                <a:srcRect t="57430" b="26991"/>
+                <a:stretch/>
+              </p:blipFill>
+              <p:spPr>
+                <a:xfrm>
+                  <a:off x="502895" y="4716764"/>
+                  <a:ext cx="2482885" cy="171918"/>
+                </a:xfrm>
+                <a:prstGeom prst="rect">
+                  <a:avLst/>
+                </a:prstGeom>
+              </p:spPr>
+            </p:pic>
+          </p:grpSp>
+          <p:sp>
+            <p:nvSpPr>
+              <p:cNvPr id="25" name="TextBox 24">
+                <a:extLst>
+                  <a:ext uri="{FF2B5EF4-FFF2-40B4-BE49-F238E27FC236}">
+                    <a16:creationId xmlns:a16="http://schemas.microsoft.com/office/drawing/2014/main" id="{26B44784-6193-F449-8A4B-595196E3F621}"/>
+                  </a:ext>
+                </a:extLst>
+              </p:cNvPr>
+              <p:cNvSpPr txBox="1"/>
+              <p:nvPr/>
+            </p:nvSpPr>
+            <p:spPr>
+              <a:xfrm>
+                <a:off x="427510" y="1155066"/>
+                <a:ext cx="519201" cy="253916"/>
+              </a:xfrm>
+              <a:prstGeom prst="rect">
+                <a:avLst/>
+              </a:prstGeom>
+              <a:noFill/>
+            </p:spPr>
+            <p:txBody>
+              <a:bodyPr wrap="square" rtlCol="0">
+                <a:spAutoFit/>
+              </a:bodyPr>
+              <a:lstStyle/>
+              <a:p>
+                <a:pPr algn="r"/>
+                <a:r>
+                  <a:rPr lang="en-US" sz="1050" dirty="0">
+                    <a:solidFill>
+                      <a:schemeClr val="tx1">
+                        <a:lumMod val="75000"/>
+                        <a:lumOff val="25000"/>
+                      </a:schemeClr>
+                    </a:solidFill>
+                    <a:latin typeface="Arial" panose="020B0604020202020204" pitchFamily="34" charset="0"/>
+                    <a:cs typeface="Arial" panose="020B0604020202020204" pitchFamily="34" charset="0"/>
+                  </a:rPr>
+                  <a:t>Wild</a:t>
+                </a:r>
+              </a:p>
+            </p:txBody>
+          </p:sp>
+          <p:sp>
+            <p:nvSpPr>
+              <p:cNvPr id="26" name="TextBox 25">
+                <a:extLst>
+                  <a:ext uri="{FF2B5EF4-FFF2-40B4-BE49-F238E27FC236}">
+                    <a16:creationId xmlns:a16="http://schemas.microsoft.com/office/drawing/2014/main" id="{B3878E72-09F9-524A-9914-F34843124E5E}"/>
+                  </a:ext>
+                </a:extLst>
+              </p:cNvPr>
+              <p:cNvSpPr txBox="1"/>
+              <p:nvPr/>
+            </p:nvSpPr>
+            <p:spPr>
+              <a:xfrm>
+                <a:off x="138069" y="1974572"/>
+                <a:ext cx="850032" cy="415498"/>
+              </a:xfrm>
+              <a:prstGeom prst="rect">
+                <a:avLst/>
+              </a:prstGeom>
+              <a:noFill/>
+            </p:spPr>
+            <p:txBody>
+              <a:bodyPr wrap="square" rtlCol="0">
+                <a:spAutoFit/>
+              </a:bodyPr>
+              <a:lstStyle/>
+              <a:p>
+                <a:pPr algn="r"/>
+                <a:r>
+                  <a:rPr lang="en-US" sz="1050" dirty="0">
+                    <a:solidFill>
+                      <a:schemeClr val="tx1">
+                        <a:lumMod val="75000"/>
+                        <a:lumOff val="25000"/>
+                      </a:schemeClr>
+                    </a:solidFill>
+                    <a:latin typeface="Arial" panose="020B0604020202020204" pitchFamily="34" charset="0"/>
+                    <a:cs typeface="Arial" panose="020B0604020202020204" pitchFamily="34" charset="0"/>
+                  </a:rPr>
+                  <a:t>7°C+ </a:t>
+                </a:r>
+              </a:p>
+              <a:p>
+                <a:pPr algn="r"/>
+                <a:r>
+                  <a:rPr lang="en-US" sz="1050" dirty="0">
+                    <a:solidFill>
+                      <a:schemeClr val="tx1">
+                        <a:lumMod val="75000"/>
+                        <a:lumOff val="25000"/>
+                      </a:schemeClr>
+                    </a:solidFill>
+                    <a:latin typeface="Arial" panose="020B0604020202020204" pitchFamily="34" charset="0"/>
+                    <a:cs typeface="Arial" panose="020B0604020202020204" pitchFamily="34" charset="0"/>
+                  </a:rPr>
+                  <a:t>high-food</a:t>
+                </a:r>
+              </a:p>
+            </p:txBody>
+          </p:sp>
+          <p:sp>
+            <p:nvSpPr>
+              <p:cNvPr id="27" name="TextBox 26">
+                <a:extLst>
+                  <a:ext uri="{FF2B5EF4-FFF2-40B4-BE49-F238E27FC236}">
+                    <a16:creationId xmlns:a16="http://schemas.microsoft.com/office/drawing/2014/main" id="{4DA35E14-E139-094F-8BBA-5BF01ADEC28D}"/>
+                  </a:ext>
+                </a:extLst>
+              </p:cNvPr>
+              <p:cNvSpPr txBox="1"/>
+              <p:nvPr/>
+            </p:nvSpPr>
+            <p:spPr>
+              <a:xfrm>
+                <a:off x="129551" y="2838407"/>
+                <a:ext cx="850032" cy="415498"/>
+              </a:xfrm>
+              <a:prstGeom prst="rect">
+                <a:avLst/>
+              </a:prstGeom>
+              <a:noFill/>
+            </p:spPr>
+            <p:txBody>
+              <a:bodyPr wrap="square" rtlCol="0">
+                <a:spAutoFit/>
+              </a:bodyPr>
+              <a:lstStyle/>
+              <a:p>
+                <a:pPr algn="r"/>
+                <a:r>
+                  <a:rPr lang="en-US" sz="1050" dirty="0">
+                    <a:solidFill>
+                      <a:schemeClr val="tx1">
+                        <a:lumMod val="75000"/>
+                        <a:lumOff val="25000"/>
+                      </a:schemeClr>
+                    </a:solidFill>
+                    <a:latin typeface="Arial" panose="020B0604020202020204" pitchFamily="34" charset="0"/>
+                    <a:cs typeface="Arial" panose="020B0604020202020204" pitchFamily="34" charset="0"/>
+                  </a:rPr>
+                  <a:t>7°C+</a:t>
+                </a:r>
+              </a:p>
+              <a:p>
+                <a:pPr algn="r"/>
+                <a:r>
+                  <a:rPr lang="en-US" sz="1050" dirty="0">
+                    <a:solidFill>
+                      <a:schemeClr val="tx1">
+                        <a:lumMod val="75000"/>
+                        <a:lumOff val="25000"/>
+                      </a:schemeClr>
+                    </a:solidFill>
+                    <a:latin typeface="Arial" panose="020B0604020202020204" pitchFamily="34" charset="0"/>
+                    <a:cs typeface="Arial" panose="020B0604020202020204" pitchFamily="34" charset="0"/>
+                  </a:rPr>
+                  <a:t>low-food</a:t>
+                </a:r>
+              </a:p>
+            </p:txBody>
+          </p:sp>
+          <p:sp>
+            <p:nvSpPr>
+              <p:cNvPr id="28" name="TextBox 27">
+                <a:extLst>
+                  <a:ext uri="{FF2B5EF4-FFF2-40B4-BE49-F238E27FC236}">
+                    <a16:creationId xmlns:a16="http://schemas.microsoft.com/office/drawing/2014/main" id="{133458E7-DFAC-1D49-AC30-3B2ADB842070}"/>
+                  </a:ext>
+                </a:extLst>
+              </p:cNvPr>
+              <p:cNvSpPr txBox="1"/>
+              <p:nvPr/>
+            </p:nvSpPr>
+            <p:spPr>
+              <a:xfrm>
+                <a:off x="129551" y="3649317"/>
+                <a:ext cx="850032" cy="415498"/>
+              </a:xfrm>
+              <a:prstGeom prst="rect">
+                <a:avLst/>
+              </a:prstGeom>
+              <a:noFill/>
+            </p:spPr>
+            <p:txBody>
+              <a:bodyPr wrap="square" rtlCol="0">
+                <a:spAutoFit/>
+              </a:bodyPr>
+              <a:lstStyle/>
+              <a:p>
+                <a:pPr algn="r"/>
+                <a:r>
+                  <a:rPr lang="en-US" sz="1050" dirty="0">
+                    <a:solidFill>
+                      <a:schemeClr val="tx1">
+                        <a:lumMod val="75000"/>
+                        <a:lumOff val="25000"/>
+                      </a:schemeClr>
+                    </a:solidFill>
+                    <a:latin typeface="Arial" panose="020B0604020202020204" pitchFamily="34" charset="0"/>
+                    <a:cs typeface="Arial" panose="020B0604020202020204" pitchFamily="34" charset="0"/>
+                  </a:rPr>
+                  <a:t>10°C+</a:t>
+                </a:r>
+              </a:p>
+              <a:p>
+                <a:pPr algn="r"/>
+                <a:r>
+                  <a:rPr lang="en-US" sz="1050" dirty="0">
+                    <a:solidFill>
+                      <a:schemeClr val="tx1">
+                        <a:lumMod val="75000"/>
+                        <a:lumOff val="25000"/>
+                      </a:schemeClr>
+                    </a:solidFill>
+                    <a:latin typeface="Arial" panose="020B0604020202020204" pitchFamily="34" charset="0"/>
+                    <a:cs typeface="Arial" panose="020B0604020202020204" pitchFamily="34" charset="0"/>
+                  </a:rPr>
+                  <a:t>high-food</a:t>
+                </a:r>
+              </a:p>
+            </p:txBody>
+          </p:sp>
+          <p:sp>
+            <p:nvSpPr>
+              <p:cNvPr id="29" name="TextBox 28">
+                <a:extLst>
+                  <a:ext uri="{FF2B5EF4-FFF2-40B4-BE49-F238E27FC236}">
+                    <a16:creationId xmlns:a16="http://schemas.microsoft.com/office/drawing/2014/main" id="{81042790-3F90-5D4D-B5EC-E33B5D50FCBE}"/>
+                  </a:ext>
+                </a:extLst>
+              </p:cNvPr>
+              <p:cNvSpPr txBox="1"/>
+              <p:nvPr/>
+            </p:nvSpPr>
+            <p:spPr>
+              <a:xfrm>
+                <a:off x="129551" y="4478913"/>
+                <a:ext cx="850032" cy="415498"/>
+              </a:xfrm>
+              <a:prstGeom prst="rect">
+                <a:avLst/>
+              </a:prstGeom>
+              <a:noFill/>
+            </p:spPr>
+            <p:txBody>
+              <a:bodyPr wrap="square" rtlCol="0">
+                <a:spAutoFit/>
+              </a:bodyPr>
+              <a:lstStyle/>
+              <a:p>
+                <a:pPr algn="r"/>
+                <a:r>
+                  <a:rPr lang="en-US" sz="1050" dirty="0">
+                    <a:solidFill>
+                      <a:schemeClr val="tx1">
+                        <a:lumMod val="75000"/>
+                        <a:lumOff val="25000"/>
+                      </a:schemeClr>
+                    </a:solidFill>
+                    <a:latin typeface="Arial" panose="020B0604020202020204" pitchFamily="34" charset="0"/>
+                    <a:cs typeface="Arial" panose="020B0604020202020204" pitchFamily="34" charset="0"/>
+                  </a:rPr>
+                  <a:t>10°C+</a:t>
+                </a:r>
+              </a:p>
+              <a:p>
+                <a:pPr algn="r"/>
+                <a:r>
+                  <a:rPr lang="en-US" sz="1050" dirty="0">
+                    <a:solidFill>
+                      <a:schemeClr val="tx1">
+                        <a:lumMod val="75000"/>
+                        <a:lumOff val="25000"/>
+                      </a:schemeClr>
+                    </a:solidFill>
+                    <a:latin typeface="Arial" panose="020B0604020202020204" pitchFamily="34" charset="0"/>
+                    <a:cs typeface="Arial" panose="020B0604020202020204" pitchFamily="34" charset="0"/>
+                  </a:rPr>
+                  <a:t>low-food</a:t>
+                </a:r>
+              </a:p>
+            </p:txBody>
+          </p:sp>
+        </p:grpSp>
+        <p:pic>
+          <p:nvPicPr>
+            <p:cNvPr id="4" name="Picture 3">
+              <a:extLst>
+                <a:ext uri="{FF2B5EF4-FFF2-40B4-BE49-F238E27FC236}">
+                  <a16:creationId xmlns:a16="http://schemas.microsoft.com/office/drawing/2014/main" id="{6E4315A8-6B59-F145-9495-2650CEE5A28F}"/>
+                </a:ext>
+              </a:extLst>
+            </p:cNvPr>
+            <p:cNvPicPr>
+              <a:picLocks noChangeAspect="1"/>
+            </p:cNvPicPr>
+            <p:nvPr/>
+          </p:nvPicPr>
+          <p:blipFill rotWithShape="1">
+            <a:blip r:embed="rId8"/>
+            <a:srcRect l="5391" t="72533"/>
+            <a:stretch/>
+          </p:blipFill>
+          <p:spPr>
+            <a:xfrm>
+              <a:off x="984688" y="5235984"/>
+              <a:ext cx="2320778" cy="299456"/>
+            </a:xfrm>
+            <a:prstGeom prst="rect">
+              <a:avLst/>
+            </a:prstGeom>
+          </p:spPr>
+        </p:pic>
+        <p:pic>
+          <p:nvPicPr>
+            <p:cNvPr id="12" name="Picture 11">
+              <a:extLst>
+                <a:ext uri="{FF2B5EF4-FFF2-40B4-BE49-F238E27FC236}">
+                  <a16:creationId xmlns:a16="http://schemas.microsoft.com/office/drawing/2014/main" id="{3F1E51A0-30B4-CF42-A1A7-2F8122F27967}"/>
+                </a:ext>
+              </a:extLst>
+            </p:cNvPr>
+            <p:cNvPicPr>
+              <a:picLocks noChangeAspect="1"/>
+            </p:cNvPicPr>
+            <p:nvPr/>
+          </p:nvPicPr>
+          <p:blipFill rotWithShape="1">
+            <a:blip r:embed="rId9"/>
+            <a:srcRect l="6911" t="73461" r="3896"/>
+            <a:stretch/>
+          </p:blipFill>
+          <p:spPr>
+            <a:xfrm>
+              <a:off x="3431495" y="5235984"/>
+              <a:ext cx="2216082" cy="293061"/>
+            </a:xfrm>
+            <a:prstGeom prst="rect">
+              <a:avLst/>
+            </a:prstGeom>
+          </p:spPr>
+        </p:pic>
+        <p:pic>
+          <p:nvPicPr>
+            <p:cNvPr id="14" name="Picture 13">
+              <a:extLst>
+                <a:ext uri="{FF2B5EF4-FFF2-40B4-BE49-F238E27FC236}">
+                  <a16:creationId xmlns:a16="http://schemas.microsoft.com/office/drawing/2014/main" id="{2D26D3EE-2759-2C42-88B3-80E2286CB06A}"/>
+                </a:ext>
+              </a:extLst>
+            </p:cNvPr>
+            <p:cNvPicPr>
+              <a:picLocks noChangeAspect="1"/>
+            </p:cNvPicPr>
+            <p:nvPr/>
+          </p:nvPicPr>
+          <p:blipFill rotWithShape="1">
+            <a:blip r:embed="rId10"/>
+            <a:srcRect l="5827" t="75348"/>
+            <a:stretch/>
+          </p:blipFill>
+          <p:spPr>
+            <a:xfrm>
+              <a:off x="5771861" y="5262498"/>
+              <a:ext cx="2216083" cy="257820"/>
+            </a:xfrm>
+            <a:prstGeom prst="rect">
+              <a:avLst/>
+            </a:prstGeom>
+          </p:spPr>
+        </p:pic>
+      </p:grpSp>
+    </p:spTree>
+    <p:extLst>
+      <p:ext uri="{BB962C8B-B14F-4D97-AF65-F5344CB8AC3E}">
+        <p14:creationId xmlns:p14="http://schemas.microsoft.com/office/powerpoint/2010/main" val="1195759612"/>
+      </p:ext>
+    </p:extLst>
+  </p:cSld>
+  <p:clrMapOvr>
+    <a:masterClrMapping/>
+  </p:clrMapOvr>
+</p:sld>
+</file>
+
+<file path=ppt/slides/slide4.xml><?xml version="1.0" encoding="utf-8"?>
 <p:sld xmlns:a="http://schemas.openxmlformats.org/drawingml/2006/main" xmlns:r="http://schemas.openxmlformats.org/officeDocument/2006/relationships" xmlns:p="http://schemas.openxmlformats.org/presentationml/2006/main">
   <p:cSld>
     <p:bg>
@@ -7885,7 +8731,7 @@
 </p:sld>
 </file>
 
-<file path=ppt/slides/slide4.xml><?xml version="1.0" encoding="utf-8"?>
+<file path=ppt/slides/slide5.xml><?xml version="1.0" encoding="utf-8"?>
 <p:sld xmlns:a="http://schemas.openxmlformats.org/drawingml/2006/main" xmlns:r="http://schemas.openxmlformats.org/officeDocument/2006/relationships" xmlns:p="http://schemas.openxmlformats.org/presentationml/2006/main">
   <p:cSld>
     <p:spTree>
@@ -7945,7 +8791,7 @@
 </p:sld>
 </file>
 
-<file path=ppt/slides/slide5.xml><?xml version="1.0" encoding="utf-8"?>
+<file path=ppt/slides/slide6.xml><?xml version="1.0" encoding="utf-8"?>
 <p:sld xmlns:a="http://schemas.openxmlformats.org/drawingml/2006/main" xmlns:r="http://schemas.openxmlformats.org/officeDocument/2006/relationships" xmlns:p="http://schemas.openxmlformats.org/presentationml/2006/main">
   <p:cSld>
     <p:spTree>
@@ -7964,10 +8810,10 @@
       </p:grpSpPr>
       <p:grpSp>
         <p:nvGrpSpPr>
-          <p:cNvPr id="5" name="Group 4">
+          <p:cNvPr id="6" name="Group 5">
             <a:extLst>
               <a:ext uri="{FF2B5EF4-FFF2-40B4-BE49-F238E27FC236}">
-                <a16:creationId xmlns:a16="http://schemas.microsoft.com/office/drawing/2014/main" id="{E888CF4D-AC0B-7140-BEC9-E90780CA102F}"/>
+                <a16:creationId xmlns:a16="http://schemas.microsoft.com/office/drawing/2014/main" id="{3F44F1D6-10A0-8D44-A81B-6FF2DF6FFD9D}"/>
               </a:ext>
             </a:extLst>
           </p:cNvPr>
@@ -7976,18 +8822,18 @@
         </p:nvGrpSpPr>
         <p:grpSpPr>
           <a:xfrm>
-            <a:off x="858117" y="627993"/>
-            <a:ext cx="5710849" cy="4572000"/>
-            <a:chOff x="858117" y="627993"/>
-            <a:chExt cx="5710849" cy="4572000"/>
+            <a:off x="858117" y="645283"/>
+            <a:ext cx="7130797" cy="4572000"/>
+            <a:chOff x="858117" y="645283"/>
+            <a:chExt cx="7130797" cy="4572000"/>
           </a:xfrm>
         </p:grpSpPr>
         <p:pic>
           <p:nvPicPr>
-            <p:cNvPr id="3" name="Picture 2">
+            <p:cNvPr id="4" name="Picture 3">
               <a:extLst>
                 <a:ext uri="{FF2B5EF4-FFF2-40B4-BE49-F238E27FC236}">
-                  <a16:creationId xmlns:a16="http://schemas.microsoft.com/office/drawing/2014/main" id="{93596AB2-7299-1645-8AC0-7C26D3BA9D00}"/>
+                  <a16:creationId xmlns:a16="http://schemas.microsoft.com/office/drawing/2014/main" id="{11538F23-B54D-8A49-B111-78F7BC7E3213}"/>
                 </a:ext>
               </a:extLst>
             </p:cNvPr>
@@ -8004,7 +8850,7 @@
           </p:blipFill>
           <p:spPr>
             <a:xfrm>
-              <a:off x="1082566" y="627993"/>
+              <a:off x="1085691" y="645283"/>
               <a:ext cx="5486400" cy="4572000"/>
             </a:xfrm>
             <a:prstGeom prst="rect">
@@ -8155,36 +9001,36 @@
             </a:p>
           </p:txBody>
         </p:sp>
+        <p:pic>
+          <p:nvPicPr>
+            <p:cNvPr id="13" name="Picture 12">
+              <a:extLst>
+                <a:ext uri="{FF2B5EF4-FFF2-40B4-BE49-F238E27FC236}">
+                  <a16:creationId xmlns:a16="http://schemas.microsoft.com/office/drawing/2014/main" id="{A64EB255-77A5-9243-960C-B765454C9493}"/>
+                </a:ext>
+              </a:extLst>
+            </p:cNvPr>
+            <p:cNvPicPr>
+              <a:picLocks noChangeAspect="1"/>
+            </p:cNvPicPr>
+            <p:nvPr/>
+          </p:nvPicPr>
+          <p:blipFill rotWithShape="1">
+            <a:blip r:embed="rId3"/>
+            <a:srcRect l="67471" t="54339" b="21322"/>
+            <a:stretch/>
+          </p:blipFill>
+          <p:spPr>
+            <a:xfrm>
+              <a:off x="6501700" y="3166765"/>
+              <a:ext cx="1487214" cy="1112783"/>
+            </a:xfrm>
+            <a:prstGeom prst="rect">
+              <a:avLst/>
+            </a:prstGeom>
+          </p:spPr>
+        </p:pic>
       </p:grpSp>
-      <p:pic>
-        <p:nvPicPr>
-          <p:cNvPr id="13" name="Picture 12">
-            <a:extLst>
-              <a:ext uri="{FF2B5EF4-FFF2-40B4-BE49-F238E27FC236}">
-                <a16:creationId xmlns:a16="http://schemas.microsoft.com/office/drawing/2014/main" id="{A64EB255-77A5-9243-960C-B765454C9493}"/>
-              </a:ext>
-            </a:extLst>
-          </p:cNvPr>
-          <p:cNvPicPr>
-            <a:picLocks noChangeAspect="1"/>
-          </p:cNvPicPr>
-          <p:nvPr/>
-        </p:nvPicPr>
-        <p:blipFill rotWithShape="1">
-          <a:blip r:embed="rId3"/>
-          <a:srcRect l="67471" t="54339" b="21322"/>
-          <a:stretch/>
-        </p:blipFill>
-        <p:spPr>
-          <a:xfrm>
-            <a:off x="6501700" y="3166765"/>
-            <a:ext cx="1487214" cy="1112783"/>
-          </a:xfrm>
-          <a:prstGeom prst="rect">
-            <a:avLst/>
-          </a:prstGeom>
-        </p:spPr>
-      </p:pic>
     </p:spTree>
     <p:extLst>
       <p:ext uri="{BB962C8B-B14F-4D97-AF65-F5344CB8AC3E}">
@@ -8198,7 +9044,7 @@
 </p:sld>
 </file>
 
-<file path=ppt/slides/slide6.xml><?xml version="1.0" encoding="utf-8"?>
+<file path=ppt/slides/slide7.xml><?xml version="1.0" encoding="utf-8"?>
 <p:sld xmlns:a="http://schemas.openxmlformats.org/drawingml/2006/main" xmlns:r="http://schemas.openxmlformats.org/officeDocument/2006/relationships" xmlns:p="http://schemas.openxmlformats.org/presentationml/2006/main">
   <p:cSld>
     <p:spTree>
@@ -8287,123 +9133,6 @@
 </p:sld>
 </file>
 
-<file path=ppt/slides/slide7.xml><?xml version="1.0" encoding="utf-8"?>
-<p:sld xmlns:a="http://schemas.openxmlformats.org/drawingml/2006/main" xmlns:r="http://schemas.openxmlformats.org/officeDocument/2006/relationships" xmlns:p="http://schemas.openxmlformats.org/presentationml/2006/main">
-  <p:cSld>
-    <p:spTree>
-      <p:nvGrpSpPr>
-        <p:cNvPr id="1" name=""/>
-        <p:cNvGrpSpPr/>
-        <p:nvPr/>
-      </p:nvGrpSpPr>
-      <p:grpSpPr>
-        <a:xfrm>
-          <a:off x="0" y="0"/>
-          <a:ext cx="0" cy="0"/>
-          <a:chOff x="0" y="0"/>
-          <a:chExt cx="0" cy="0"/>
-        </a:xfrm>
-      </p:grpSpPr>
-      <p:pic>
-        <p:nvPicPr>
-          <p:cNvPr id="7" name="Picture 6">
-            <a:extLst>
-              <a:ext uri="{FF2B5EF4-FFF2-40B4-BE49-F238E27FC236}">
-                <a16:creationId xmlns:a16="http://schemas.microsoft.com/office/drawing/2014/main" id="{5680227A-6F33-064B-8D82-50FEC0AAC9B9}"/>
-              </a:ext>
-            </a:extLst>
-          </p:cNvPr>
-          <p:cNvPicPr>
-            <a:picLocks noChangeAspect="1"/>
-          </p:cNvPicPr>
-          <p:nvPr/>
-        </p:nvPicPr>
-        <p:blipFill rotWithShape="1">
-          <a:blip r:embed="rId2"/>
-          <a:srcRect l="69748" t="8059" b="57143"/>
-          <a:stretch/>
-        </p:blipFill>
-        <p:spPr>
-          <a:xfrm>
-            <a:off x="914401" y="914400"/>
-            <a:ext cx="2351314" cy="2068286"/>
-          </a:xfrm>
-          <a:prstGeom prst="rect">
-            <a:avLst/>
-          </a:prstGeom>
-        </p:spPr>
-      </p:pic>
-      <p:pic>
-        <p:nvPicPr>
-          <p:cNvPr id="9" name="Picture 8">
-            <a:extLst>
-              <a:ext uri="{FF2B5EF4-FFF2-40B4-BE49-F238E27FC236}">
-                <a16:creationId xmlns:a16="http://schemas.microsoft.com/office/drawing/2014/main" id="{5EF47965-95B0-CF44-A417-1A5025357A40}"/>
-              </a:ext>
-            </a:extLst>
-          </p:cNvPr>
-          <p:cNvPicPr>
-            <a:picLocks noChangeAspect="1"/>
-          </p:cNvPicPr>
-          <p:nvPr/>
-        </p:nvPicPr>
-        <p:blipFill rotWithShape="1">
-          <a:blip r:embed="rId3"/>
-          <a:srcRect l="69748" t="7692" b="57509"/>
-          <a:stretch/>
-        </p:blipFill>
-        <p:spPr>
-          <a:xfrm>
-            <a:off x="4310742" y="914400"/>
-            <a:ext cx="2351316" cy="2068286"/>
-          </a:xfrm>
-          <a:prstGeom prst="rect">
-            <a:avLst/>
-          </a:prstGeom>
-        </p:spPr>
-      </p:pic>
-      <p:pic>
-        <p:nvPicPr>
-          <p:cNvPr id="11" name="Picture 10">
-            <a:extLst>
-              <a:ext uri="{FF2B5EF4-FFF2-40B4-BE49-F238E27FC236}">
-                <a16:creationId xmlns:a16="http://schemas.microsoft.com/office/drawing/2014/main" id="{C2B9FBA1-93AF-2B4F-9A39-6ED9DD2306A8}"/>
-              </a:ext>
-            </a:extLst>
-          </p:cNvPr>
-          <p:cNvPicPr>
-            <a:picLocks noChangeAspect="1"/>
-          </p:cNvPicPr>
-          <p:nvPr/>
-        </p:nvPicPr>
-        <p:blipFill rotWithShape="1">
-          <a:blip r:embed="rId4"/>
-          <a:srcRect l="69748" t="7693" b="51282"/>
-          <a:stretch/>
-        </p:blipFill>
-        <p:spPr>
-          <a:xfrm>
-            <a:off x="914400" y="3243942"/>
-            <a:ext cx="2351315" cy="2438400"/>
-          </a:xfrm>
-          <a:prstGeom prst="rect">
-            <a:avLst/>
-          </a:prstGeom>
-        </p:spPr>
-      </p:pic>
-    </p:spTree>
-    <p:extLst>
-      <p:ext uri="{BB962C8B-B14F-4D97-AF65-F5344CB8AC3E}">
-        <p14:creationId xmlns:p14="http://schemas.microsoft.com/office/powerpoint/2010/main" val="3576426135"/>
-      </p:ext>
-    </p:extLst>
-  </p:cSld>
-  <p:clrMapOvr>
-    <a:masterClrMapping/>
-  </p:clrMapOvr>
-</p:sld>
-</file>
-
 <file path=ppt/slides/slide8.xml><?xml version="1.0" encoding="utf-8"?>
 <p:sld xmlns:a="http://schemas.openxmlformats.org/drawingml/2006/main" xmlns:r="http://schemas.openxmlformats.org/officeDocument/2006/relationships" xmlns:p="http://schemas.openxmlformats.org/presentationml/2006/main">
   <p:cSld>
@@ -8421,40 +9150,198 @@
           <a:chExt cx="0" cy="0"/>
         </a:xfrm>
       </p:grpSpPr>
-      <p:pic>
-        <p:nvPicPr>
-          <p:cNvPr id="5" name="Picture 4">
+      <p:grpSp>
+        <p:nvGrpSpPr>
+          <p:cNvPr id="4" name="Group 3">
             <a:extLst>
               <a:ext uri="{FF2B5EF4-FFF2-40B4-BE49-F238E27FC236}">
-                <a16:creationId xmlns:a16="http://schemas.microsoft.com/office/drawing/2014/main" id="{F10F54B1-A393-0749-8C27-FC47CDD4768A}"/>
+                <a16:creationId xmlns:a16="http://schemas.microsoft.com/office/drawing/2014/main" id="{3BFDDE80-D3BA-7A44-8FC8-4CFB5126EED9}"/>
               </a:ext>
             </a:extLst>
           </p:cNvPr>
-          <p:cNvPicPr>
-            <a:picLocks noChangeAspect="1"/>
-          </p:cNvPicPr>
+          <p:cNvGrpSpPr/>
           <p:nvPr/>
-        </p:nvPicPr>
-        <p:blipFill>
-          <a:blip r:embed="rId2"/>
-          <a:stretch>
-            <a:fillRect/>
-          </a:stretch>
-        </p:blipFill>
-        <p:spPr>
+        </p:nvGrpSpPr>
+        <p:grpSpPr>
           <a:xfrm>
-            <a:off x="500063" y="685800"/>
-            <a:ext cx="5486400" cy="5486400"/>
+            <a:off x="454524" y="775009"/>
+            <a:ext cx="7532540" cy="4767146"/>
+            <a:chOff x="433157" y="685800"/>
+            <a:chExt cx="8669029" cy="5486400"/>
           </a:xfrm>
-          <a:prstGeom prst="rect">
-            <a:avLst/>
-          </a:prstGeom>
-        </p:spPr>
-      </p:pic>
+        </p:grpSpPr>
+        <p:pic>
+          <p:nvPicPr>
+            <p:cNvPr id="5" name="Picture 4">
+              <a:extLst>
+                <a:ext uri="{FF2B5EF4-FFF2-40B4-BE49-F238E27FC236}">
+                  <a16:creationId xmlns:a16="http://schemas.microsoft.com/office/drawing/2014/main" id="{F10F54B1-A393-0749-8C27-FC47CDD4768A}"/>
+                </a:ext>
+              </a:extLst>
+            </p:cNvPr>
+            <p:cNvPicPr>
+              <a:picLocks noChangeAspect="1"/>
+            </p:cNvPicPr>
+            <p:nvPr/>
+          </p:nvPicPr>
+          <p:blipFill rotWithShape="1">
+            <a:blip r:embed="rId2"/>
+            <a:srcRect r="29948"/>
+            <a:stretch/>
+          </p:blipFill>
+          <p:spPr>
+            <a:xfrm>
+              <a:off x="433157" y="685800"/>
+              <a:ext cx="3843338" cy="5486400"/>
+            </a:xfrm>
+            <a:prstGeom prst="rect">
+              <a:avLst/>
+            </a:prstGeom>
+          </p:spPr>
+        </p:pic>
+        <p:pic>
+          <p:nvPicPr>
+            <p:cNvPr id="3" name="Picture 2">
+              <a:extLst>
+                <a:ext uri="{FF2B5EF4-FFF2-40B4-BE49-F238E27FC236}">
+                  <a16:creationId xmlns:a16="http://schemas.microsoft.com/office/drawing/2014/main" id="{56BDC90E-2808-2847-8B58-814D3336B4D6}"/>
+                </a:ext>
+              </a:extLst>
+            </p:cNvPr>
+            <p:cNvPicPr>
+              <a:picLocks noChangeAspect="1"/>
+            </p:cNvPicPr>
+            <p:nvPr/>
+          </p:nvPicPr>
+          <p:blipFill rotWithShape="1">
+            <a:blip r:embed="rId3"/>
+            <a:srcRect r="1685"/>
+            <a:stretch/>
+          </p:blipFill>
+          <p:spPr>
+            <a:xfrm>
+              <a:off x="4220740" y="744597"/>
+              <a:ext cx="4881446" cy="5416452"/>
+            </a:xfrm>
+            <a:prstGeom prst="rect">
+              <a:avLst/>
+            </a:prstGeom>
+          </p:spPr>
+        </p:pic>
+      </p:grpSp>
     </p:spTree>
     <p:extLst>
       <p:ext uri="{BB962C8B-B14F-4D97-AF65-F5344CB8AC3E}">
         <p14:creationId xmlns:p14="http://schemas.microsoft.com/office/powerpoint/2010/main" val="1357512634"/>
+      </p:ext>
+    </p:extLst>
+  </p:cSld>
+  <p:clrMapOvr>
+    <a:masterClrMapping/>
+  </p:clrMapOvr>
+</p:sld>
+</file>
+
+<file path=ppt/slides/slide9.xml><?xml version="1.0" encoding="utf-8"?>
+<p:sld xmlns:a="http://schemas.openxmlformats.org/drawingml/2006/main" xmlns:r="http://schemas.openxmlformats.org/officeDocument/2006/relationships" xmlns:p="http://schemas.openxmlformats.org/presentationml/2006/main">
+  <p:cSld>
+    <p:spTree>
+      <p:nvGrpSpPr>
+        <p:cNvPr id="1" name=""/>
+        <p:cNvGrpSpPr/>
+        <p:nvPr/>
+      </p:nvGrpSpPr>
+      <p:grpSpPr>
+        <a:xfrm>
+          <a:off x="0" y="0"/>
+          <a:ext cx="0" cy="0"/>
+          <a:chOff x="0" y="0"/>
+          <a:chExt cx="0" cy="0"/>
+        </a:xfrm>
+      </p:grpSpPr>
+      <p:grpSp>
+        <p:nvGrpSpPr>
+          <p:cNvPr id="8" name="Group 7">
+            <a:extLst>
+              <a:ext uri="{FF2B5EF4-FFF2-40B4-BE49-F238E27FC236}">
+                <a16:creationId xmlns:a16="http://schemas.microsoft.com/office/drawing/2014/main" id="{1D994E36-F81C-734F-BE8F-A593298D29E5}"/>
+              </a:ext>
+            </a:extLst>
+          </p:cNvPr>
+          <p:cNvGrpSpPr/>
+          <p:nvPr/>
+        </p:nvGrpSpPr>
+        <p:grpSpPr>
+          <a:xfrm>
+            <a:off x="914400" y="1035050"/>
+            <a:ext cx="5575610" cy="4787900"/>
+            <a:chOff x="914400" y="1035050"/>
+            <a:chExt cx="5575610" cy="4787900"/>
+          </a:xfrm>
+        </p:grpSpPr>
+        <p:pic>
+          <p:nvPicPr>
+            <p:cNvPr id="6" name="Picture 5">
+              <a:extLst>
+                <a:ext uri="{FF2B5EF4-FFF2-40B4-BE49-F238E27FC236}">
+                  <a16:creationId xmlns:a16="http://schemas.microsoft.com/office/drawing/2014/main" id="{6704E5DC-E6EA-5542-9CAE-490BD90A7D2C}"/>
+                </a:ext>
+              </a:extLst>
+            </p:cNvPr>
+            <p:cNvPicPr>
+              <a:picLocks noChangeAspect="1"/>
+            </p:cNvPicPr>
+            <p:nvPr/>
+          </p:nvPicPr>
+          <p:blipFill rotWithShape="1">
+            <a:blip r:embed="rId2"/>
+            <a:srcRect r="23780"/>
+            <a:stretch/>
+          </p:blipFill>
+          <p:spPr>
+            <a:xfrm>
+              <a:off x="914400" y="1035050"/>
+              <a:ext cx="5575610" cy="4787900"/>
+            </a:xfrm>
+            <a:prstGeom prst="rect">
+              <a:avLst/>
+            </a:prstGeom>
+          </p:spPr>
+        </p:pic>
+        <p:pic>
+          <p:nvPicPr>
+            <p:cNvPr id="7" name="Picture 6">
+              <a:extLst>
+                <a:ext uri="{FF2B5EF4-FFF2-40B4-BE49-F238E27FC236}">
+                  <a16:creationId xmlns:a16="http://schemas.microsoft.com/office/drawing/2014/main" id="{F983487C-2AF8-BF4F-94F9-9C85733B8AE5}"/>
+                </a:ext>
+              </a:extLst>
+            </p:cNvPr>
+            <p:cNvPicPr>
+              <a:picLocks noChangeAspect="1"/>
+            </p:cNvPicPr>
+            <p:nvPr/>
+          </p:nvPicPr>
+          <p:blipFill rotWithShape="1">
+            <a:blip r:embed="rId3"/>
+            <a:srcRect l="67471" t="53655" b="21322"/>
+            <a:stretch/>
+          </p:blipFill>
+          <p:spPr>
+            <a:xfrm>
+              <a:off x="1518716" y="1500372"/>
+              <a:ext cx="1487214" cy="1144046"/>
+            </a:xfrm>
+            <a:prstGeom prst="rect">
+              <a:avLst/>
+            </a:prstGeom>
+          </p:spPr>
+        </p:pic>
+      </p:grpSp>
+    </p:spTree>
+    <p:extLst>
+      <p:ext uri="{BB962C8B-B14F-4D97-AF65-F5344CB8AC3E}">
+        <p14:creationId xmlns:p14="http://schemas.microsoft.com/office/powerpoint/2010/main" val="230629001"/>
       </p:ext>
     </p:extLst>
   </p:cSld>

</xml_diff>